<commit_message>
Recitation Slides 14 fixed
</commit_message>
<xml_diff>
--- a/rec-notes/r14.pptx
+++ b/rec-notes/r14.pptx
@@ -229,7 +229,7 @@
           <a:p>
             <a:fld id="{D10EB390-44ED-0E40-92C1-B6A41B775C55}" type="datetimeFigureOut">
               <a:rPr lang="en-US" smtClean="0"/>
-              <a:t>12/9/20</a:t>
+              <a:t>12/10/20</a:t>
             </a:fld>
             <a:endParaRPr lang="en-US"/>
           </a:p>
@@ -2920,7 +2920,7 @@
           <a:p>
             <a:fld id="{3A59ADAB-BBCC-F949-A081-87A8AA8AF28F}" type="datetime1">
               <a:rPr lang="en-US" smtClean="0"/>
-              <a:t>12/9/20</a:t>
+              <a:t>12/10/20</a:t>
             </a:fld>
             <a:endParaRPr lang="en-US"/>
           </a:p>
@@ -3090,7 +3090,7 @@
           <a:p>
             <a:fld id="{8FE8999B-80FD-924A-97F5-C4750CAE7668}" type="datetime1">
               <a:rPr lang="en-US" smtClean="0"/>
-              <a:t>12/9/20</a:t>
+              <a:t>12/10/20</a:t>
             </a:fld>
             <a:endParaRPr lang="en-US"/>
           </a:p>
@@ -3270,7 +3270,7 @@
           <a:p>
             <a:fld id="{5DBC9EF0-7A43-CD4C-A90F-D0BA77F4770C}" type="datetime1">
               <a:rPr lang="en-US" smtClean="0"/>
-              <a:t>12/9/20</a:t>
+              <a:t>12/10/20</a:t>
             </a:fld>
             <a:endParaRPr lang="en-US"/>
           </a:p>
@@ -3440,7 +3440,7 @@
           <a:p>
             <a:fld id="{30FE6CD8-3161-E248-848F-BC81A4196DF0}" type="datetime1">
               <a:rPr lang="en-US" smtClean="0"/>
-              <a:t>12/9/20</a:t>
+              <a:t>12/10/20</a:t>
             </a:fld>
             <a:endParaRPr lang="en-US"/>
           </a:p>
@@ -3691,7 +3691,7 @@
           <a:p>
             <a:fld id="{88E30255-24F0-744C-B067-2E5A712172CD}" type="datetime1">
               <a:rPr lang="en-US" smtClean="0"/>
-              <a:t>12/9/20</a:t>
+              <a:t>12/10/20</a:t>
             </a:fld>
             <a:endParaRPr lang="en-US"/>
           </a:p>
@@ -3928,7 +3928,7 @@
           <a:p>
             <a:fld id="{C5A07523-CC79-514B-AC43-6AE1E09B4F02}" type="datetime1">
               <a:rPr lang="en-US" smtClean="0"/>
-              <a:t>12/9/20</a:t>
+              <a:t>12/10/20</a:t>
             </a:fld>
             <a:endParaRPr lang="en-US"/>
           </a:p>
@@ -4295,7 +4295,7 @@
           <a:p>
             <a:fld id="{7BC86B14-8390-644E-8E41-468E9DBBF555}" type="datetime1">
               <a:rPr lang="en-US" smtClean="0"/>
-              <a:t>12/9/20</a:t>
+              <a:t>12/10/20</a:t>
             </a:fld>
             <a:endParaRPr lang="en-US"/>
           </a:p>
@@ -4413,7 +4413,7 @@
           <a:p>
             <a:fld id="{EE7FBB16-0FC9-3948-9992-DCF31CB7DEBA}" type="datetime1">
               <a:rPr lang="en-US" smtClean="0"/>
-              <a:t>12/9/20</a:t>
+              <a:t>12/10/20</a:t>
             </a:fld>
             <a:endParaRPr lang="en-US"/>
           </a:p>
@@ -4508,7 +4508,7 @@
           <a:p>
             <a:fld id="{BCF0ED23-52D7-4E46-88E7-5B89F8103BA7}" type="datetime1">
               <a:rPr lang="en-US" smtClean="0"/>
-              <a:t>12/9/20</a:t>
+              <a:t>12/10/20</a:t>
             </a:fld>
             <a:endParaRPr lang="en-US"/>
           </a:p>
@@ -4785,7 +4785,7 @@
           <a:p>
             <a:fld id="{5B9A98C1-9A8C-9A45-9CB8-C4B122DFDF81}" type="datetime1">
               <a:rPr lang="en-US" smtClean="0"/>
-              <a:t>12/9/20</a:t>
+              <a:t>12/10/20</a:t>
             </a:fld>
             <a:endParaRPr lang="en-US"/>
           </a:p>
@@ -5042,7 +5042,7 @@
           <a:p>
             <a:fld id="{0634242F-75B6-E24E-98ED-1BF46471A995}" type="datetime1">
               <a:rPr lang="en-US" smtClean="0"/>
-              <a:t>12/9/20</a:t>
+              <a:t>12/10/20</a:t>
             </a:fld>
             <a:endParaRPr lang="en-US"/>
           </a:p>
@@ -5255,7 +5255,7 @@
           <a:p>
             <a:fld id="{CE3A7F5D-60CC-4242-A5C5-2F2F1AA84E32}" type="datetime1">
               <a:rPr lang="en-US" smtClean="0"/>
-              <a:t>12/9/20</a:t>
+              <a:t>12/10/20</a:t>
             </a:fld>
             <a:endParaRPr lang="en-US"/>
           </a:p>
@@ -13060,7 +13060,7 @@
         <p:spPr>
           <a:xfrm>
             <a:off x="2755900" y="5029200"/>
-            <a:ext cx="7810500" cy="2031325"/>
+            <a:ext cx="7810500" cy="1477328"/>
           </a:xfrm>
           <a:prstGeom prst="rect">
             <a:avLst/>
@@ -13097,8 +13097,13 @@
                   <a:schemeClr val="accent1"/>
                 </a:solidFill>
               </a:rPr>
-              <a:t>previous: 200 instruction fetch  + 100 register read + 200 ALU + 200 data access + 100 register write </a:t>
-            </a:r>
+              <a:t>5-stage: 200ps*5</a:t>
+            </a:r>
+            <a:endParaRPr lang="en-US" dirty="0" smtClean="0">
+              <a:solidFill>
+                <a:schemeClr val="accent1"/>
+              </a:solidFill>
+            </a:endParaRPr>
           </a:p>
           <a:p>
             <a:pPr marL="285750" indent="-285750">
@@ -13111,8 +13116,13 @@
                   <a:schemeClr val="accent1"/>
                 </a:solidFill>
               </a:rPr>
-              <a:t>combine ALU &amp; data access:</a:t>
-            </a:r>
+              <a:t>4-stage:</a:t>
+            </a:r>
+            <a:endParaRPr lang="en-US" dirty="0" smtClean="0">
+              <a:solidFill>
+                <a:schemeClr val="accent1"/>
+              </a:solidFill>
+            </a:endParaRPr>
           </a:p>
           <a:p>
             <a:pPr marL="742950" lvl="1" indent="-285750">
@@ -13125,8 +13135,13 @@
                   <a:schemeClr val="accent1"/>
                 </a:solidFill>
               </a:rPr>
-              <a:t>200 instruction fetch  + 100 register read + 200 ALU/data access + 100 register write</a:t>
-            </a:r>
+              <a:t>200ps*4</a:t>
+            </a:r>
+            <a:endParaRPr lang="en-US" dirty="0" smtClean="0">
+              <a:solidFill>
+                <a:schemeClr val="accent1"/>
+              </a:solidFill>
+            </a:endParaRPr>
           </a:p>
           <a:p>
             <a:endParaRPr lang="en-US" dirty="0"/>

</xml_diff>